<commit_message>
modified according to suggestions
</commit_message>
<xml_diff>
--- a/layout.pptx
+++ b/layout.pptx
@@ -104,6 +104,11 @@
       </a:defRPr>
     </a:lvl9pPr>
   </p:defaultTextStyle>
+  <p:extLst>
+    <p:ext uri="{EFAFB233-063F-42B5-8137-9DF3F51BA10A}">
+      <p15:sldGuideLst xmlns:p15="http://schemas.microsoft.com/office/powerpoint/2012/main"/>
+    </p:ext>
+  </p:extLst>
 </p:presentation>
 </file>
 
@@ -238,7 +243,7 @@
           <a:p>
             <a:fld id="{E70BBDB4-4F6F-4DEC-A77E-44031484CD92}" type="datetimeFigureOut">
               <a:rPr lang="ko-KR" altLang="en-US" smtClean="0"/>
-              <a:t>2017-06-21</a:t>
+              <a:t>2017-09-01</a:t>
             </a:fld>
             <a:endParaRPr lang="ko-KR" altLang="en-US"/>
           </a:p>
@@ -408,7 +413,7 @@
           <a:p>
             <a:fld id="{E70BBDB4-4F6F-4DEC-A77E-44031484CD92}" type="datetimeFigureOut">
               <a:rPr lang="ko-KR" altLang="en-US" smtClean="0"/>
-              <a:t>2017-06-21</a:t>
+              <a:t>2017-09-01</a:t>
             </a:fld>
             <a:endParaRPr lang="ko-KR" altLang="en-US"/>
           </a:p>
@@ -588,7 +593,7 @@
           <a:p>
             <a:fld id="{E70BBDB4-4F6F-4DEC-A77E-44031484CD92}" type="datetimeFigureOut">
               <a:rPr lang="ko-KR" altLang="en-US" smtClean="0"/>
-              <a:t>2017-06-21</a:t>
+              <a:t>2017-09-01</a:t>
             </a:fld>
             <a:endParaRPr lang="ko-KR" altLang="en-US"/>
           </a:p>
@@ -758,7 +763,7 @@
           <a:p>
             <a:fld id="{E70BBDB4-4F6F-4DEC-A77E-44031484CD92}" type="datetimeFigureOut">
               <a:rPr lang="ko-KR" altLang="en-US" smtClean="0"/>
-              <a:t>2017-06-21</a:t>
+              <a:t>2017-09-01</a:t>
             </a:fld>
             <a:endParaRPr lang="ko-KR" altLang="en-US"/>
           </a:p>
@@ -1004,7 +1009,7 @@
           <a:p>
             <a:fld id="{E70BBDB4-4F6F-4DEC-A77E-44031484CD92}" type="datetimeFigureOut">
               <a:rPr lang="ko-KR" altLang="en-US" smtClean="0"/>
-              <a:t>2017-06-21</a:t>
+              <a:t>2017-09-01</a:t>
             </a:fld>
             <a:endParaRPr lang="ko-KR" altLang="en-US"/>
           </a:p>
@@ -1236,7 +1241,7 @@
           <a:p>
             <a:fld id="{E70BBDB4-4F6F-4DEC-A77E-44031484CD92}" type="datetimeFigureOut">
               <a:rPr lang="ko-KR" altLang="en-US" smtClean="0"/>
-              <a:t>2017-06-21</a:t>
+              <a:t>2017-09-01</a:t>
             </a:fld>
             <a:endParaRPr lang="ko-KR" altLang="en-US"/>
           </a:p>
@@ -1603,7 +1608,7 @@
           <a:p>
             <a:fld id="{E70BBDB4-4F6F-4DEC-A77E-44031484CD92}" type="datetimeFigureOut">
               <a:rPr lang="ko-KR" altLang="en-US" smtClean="0"/>
-              <a:t>2017-06-21</a:t>
+              <a:t>2017-09-01</a:t>
             </a:fld>
             <a:endParaRPr lang="ko-KR" altLang="en-US"/>
           </a:p>
@@ -1721,7 +1726,7 @@
           <a:p>
             <a:fld id="{E70BBDB4-4F6F-4DEC-A77E-44031484CD92}" type="datetimeFigureOut">
               <a:rPr lang="ko-KR" altLang="en-US" smtClean="0"/>
-              <a:t>2017-06-21</a:t>
+              <a:t>2017-09-01</a:t>
             </a:fld>
             <a:endParaRPr lang="ko-KR" altLang="en-US"/>
           </a:p>
@@ -1816,7 +1821,7 @@
           <a:p>
             <a:fld id="{E70BBDB4-4F6F-4DEC-A77E-44031484CD92}" type="datetimeFigureOut">
               <a:rPr lang="ko-KR" altLang="en-US" smtClean="0"/>
-              <a:t>2017-06-21</a:t>
+              <a:t>2017-09-01</a:t>
             </a:fld>
             <a:endParaRPr lang="ko-KR" altLang="en-US"/>
           </a:p>
@@ -2093,7 +2098,7 @@
           <a:p>
             <a:fld id="{E70BBDB4-4F6F-4DEC-A77E-44031484CD92}" type="datetimeFigureOut">
               <a:rPr lang="ko-KR" altLang="en-US" smtClean="0"/>
-              <a:t>2017-06-21</a:t>
+              <a:t>2017-09-01</a:t>
             </a:fld>
             <a:endParaRPr lang="ko-KR" altLang="en-US"/>
           </a:p>
@@ -2346,7 +2351,7 @@
           <a:p>
             <a:fld id="{E70BBDB4-4F6F-4DEC-A77E-44031484CD92}" type="datetimeFigureOut">
               <a:rPr lang="ko-KR" altLang="en-US" smtClean="0"/>
-              <a:t>2017-06-21</a:t>
+              <a:t>2017-09-01</a:t>
             </a:fld>
             <a:endParaRPr lang="ko-KR" altLang="en-US"/>
           </a:p>
@@ -2559,7 +2564,7 @@
           <a:p>
             <a:fld id="{E70BBDB4-4F6F-4DEC-A77E-44031484CD92}" type="datetimeFigureOut">
               <a:rPr lang="ko-KR" altLang="en-US" smtClean="0"/>
-              <a:t>2017-06-21</a:t>
+              <a:t>2017-09-01</a:t>
             </a:fld>
             <a:endParaRPr lang="ko-KR" altLang="en-US"/>
           </a:p>
@@ -2972,10 +2977,10 @@
         </p:nvGrpSpPr>
         <p:grpSpPr>
           <a:xfrm>
-            <a:off x="3159873" y="934806"/>
-            <a:ext cx="6680732" cy="4319005"/>
-            <a:chOff x="3159873" y="934806"/>
-            <a:chExt cx="6680732" cy="4319005"/>
+            <a:off x="689721" y="1027661"/>
+            <a:ext cx="6680732" cy="4392405"/>
+            <a:chOff x="3159873" y="861406"/>
+            <a:chExt cx="6680732" cy="4392405"/>
           </a:xfrm>
         </p:grpSpPr>
         <p:grpSp>
@@ -2984,7 +2989,7 @@
             <p:cNvGrpSpPr/>
             <p:nvPr>
               <p:custDataLst>
-                <p:custData r:id="rId1"/>
+                <p:custData r:id="rId7"/>
               </p:custDataLst>
             </p:nvPr>
           </p:nvGrpSpPr>
@@ -3005,7 +3010,7 @@
               <p:nvPr/>
             </p:nvPicPr>
             <p:blipFill>
-              <a:blip r:embed="rId3"/>
+              <a:blip r:embed="rId9"/>
               <a:stretch>
                 <a:fillRect/>
               </a:stretch>
@@ -3348,7 +3353,7 @@
             </p:nvSpPr>
             <p:spPr>
               <a:xfrm>
-                <a:off x="4954556" y="4619086"/>
+                <a:off x="4461270" y="4506162"/>
                 <a:ext cx="1588576" cy="369332"/>
               </a:xfrm>
               <a:prstGeom prst="rect">
@@ -3383,7 +3388,7 @@
           </p:nvSpPr>
           <p:spPr>
             <a:xfrm>
-              <a:off x="5308329" y="934806"/>
+              <a:off x="5758721" y="861406"/>
               <a:ext cx="1483035" cy="646331"/>
             </a:xfrm>
             <a:prstGeom prst="rect">
@@ -3421,8 +3426,8 @@
           </p:nvCxnSpPr>
           <p:spPr>
             <a:xfrm>
-              <a:off x="6543132" y="1584960"/>
-              <a:ext cx="235620" cy="255530"/>
+              <a:off x="6626516" y="1443618"/>
+              <a:ext cx="152236" cy="396872"/>
             </a:xfrm>
             <a:prstGeom prst="straightConnector1">
               <a:avLst/>
@@ -3447,6 +3452,1328 @@
           </p:style>
         </p:cxnSp>
       </p:grpSp>
+      <p:sp>
+        <p:nvSpPr>
+          <p:cNvPr id="2" name="TextBox 1"/>
+          <p:cNvSpPr txBox="1"/>
+          <p:nvPr/>
+        </p:nvSpPr>
+        <p:spPr>
+          <a:xfrm>
+            <a:off x="3792682" y="5642264"/>
+            <a:ext cx="474810" cy="400110"/>
+          </a:xfrm>
+          <a:prstGeom prst="rect">
+            <a:avLst/>
+          </a:prstGeom>
+          <a:noFill/>
+        </p:spPr>
+        <p:txBody>
+          <a:bodyPr wrap="none" rtlCol="0">
+            <a:spAutoFit/>
+          </a:bodyPr>
+          <a:lstStyle/>
+          <a:p>
+            <a:r>
+              <a:rPr lang="en-US" altLang="ko-KR" sz="2000" dirty="0" smtClean="0"/>
+              <a:t>(a)</a:t>
+            </a:r>
+            <a:endParaRPr lang="ko-KR" altLang="en-US" sz="2000"/>
+          </a:p>
+        </p:txBody>
+      </p:sp>
+      <p:sp>
+        <p:nvSpPr>
+          <p:cNvPr id="18" name="TextBox 17"/>
+          <p:cNvSpPr txBox="1"/>
+          <p:nvPr/>
+        </p:nvSpPr>
+        <p:spPr>
+          <a:xfrm>
+            <a:off x="9337156" y="5642264"/>
+            <a:ext cx="495649" cy="400110"/>
+          </a:xfrm>
+          <a:prstGeom prst="rect">
+            <a:avLst/>
+          </a:prstGeom>
+          <a:noFill/>
+        </p:spPr>
+        <p:txBody>
+          <a:bodyPr wrap="none" rtlCol="0">
+            <a:spAutoFit/>
+          </a:bodyPr>
+          <a:lstStyle/>
+          <a:p>
+            <a:r>
+              <a:rPr lang="en-US" altLang="ko-KR" sz="2000" dirty="0" smtClean="0"/>
+              <a:t>(b)</a:t>
+            </a:r>
+            <a:endParaRPr lang="ko-KR" altLang="en-US" sz="2000"/>
+          </a:p>
+        </p:txBody>
+      </p:sp>
+      <p:grpSp>
+        <p:nvGrpSpPr>
+          <p:cNvPr id="37" name="그룹 36"/>
+          <p:cNvGrpSpPr/>
+          <p:nvPr/>
+        </p:nvGrpSpPr>
+        <p:grpSpPr>
+          <a:xfrm>
+            <a:off x="7895021" y="2368568"/>
+            <a:ext cx="3379917" cy="754119"/>
+            <a:chOff x="7794413" y="2808632"/>
+            <a:chExt cx="3379917" cy="754119"/>
+          </a:xfrm>
+        </p:grpSpPr>
+        <p:grpSp>
+          <p:nvGrpSpPr>
+            <p:cNvPr id="30" name="그룹 29"/>
+            <p:cNvGrpSpPr/>
+            <p:nvPr/>
+          </p:nvGrpSpPr>
+          <p:grpSpPr>
+            <a:xfrm>
+              <a:off x="8677303" y="2808632"/>
+              <a:ext cx="1815357" cy="754119"/>
+              <a:chOff x="8562109" y="2342372"/>
+              <a:chExt cx="1440872" cy="405245"/>
+            </a:xfrm>
+          </p:grpSpPr>
+          <p:sp>
+            <p:nvSpPr>
+              <p:cNvPr id="3" name="직사각형 2"/>
+              <p:cNvSpPr/>
+              <p:nvPr/>
+            </p:nvSpPr>
+            <p:spPr>
+              <a:xfrm>
+                <a:off x="8977745" y="2342372"/>
+                <a:ext cx="609600" cy="405245"/>
+              </a:xfrm>
+              <a:prstGeom prst="rect">
+                <a:avLst/>
+              </a:prstGeom>
+              <a:solidFill>
+                <a:srgbClr val="FF0000"/>
+              </a:solidFill>
+              <a:ln>
+                <a:noFill/>
+              </a:ln>
+            </p:spPr>
+            <p:style>
+              <a:lnRef idx="2">
+                <a:schemeClr val="accent1">
+                  <a:shade val="50000"/>
+                </a:schemeClr>
+              </a:lnRef>
+              <a:fillRef idx="1">
+                <a:schemeClr val="accent1"/>
+              </a:fillRef>
+              <a:effectRef idx="0">
+                <a:schemeClr val="accent1"/>
+              </a:effectRef>
+              <a:fontRef idx="minor">
+                <a:schemeClr val="lt1"/>
+              </a:fontRef>
+            </p:style>
+            <p:txBody>
+              <a:bodyPr rtlCol="0" anchor="ctr"/>
+              <a:lstStyle/>
+              <a:p>
+                <a:pPr algn="ctr"/>
+                <a:endParaRPr lang="ko-KR" altLang="en-US"/>
+              </a:p>
+            </p:txBody>
+          </p:sp>
+          <p:sp>
+            <p:nvSpPr>
+              <p:cNvPr id="21" name="직사각형 20"/>
+              <p:cNvSpPr/>
+              <p:nvPr/>
+            </p:nvSpPr>
+            <p:spPr>
+              <a:xfrm>
+                <a:off x="8562109" y="2423811"/>
+                <a:ext cx="415636" cy="45719"/>
+              </a:xfrm>
+              <a:prstGeom prst="rect">
+                <a:avLst/>
+              </a:prstGeom>
+              <a:solidFill>
+                <a:srgbClr val="FF0000"/>
+              </a:solidFill>
+              <a:ln>
+                <a:noFill/>
+              </a:ln>
+            </p:spPr>
+            <p:style>
+              <a:lnRef idx="2">
+                <a:schemeClr val="accent1">
+                  <a:shade val="50000"/>
+                </a:schemeClr>
+              </a:lnRef>
+              <a:fillRef idx="1">
+                <a:schemeClr val="accent1"/>
+              </a:fillRef>
+              <a:effectRef idx="0">
+                <a:schemeClr val="accent1"/>
+              </a:effectRef>
+              <a:fontRef idx="minor">
+                <a:schemeClr val="lt1"/>
+              </a:fontRef>
+            </p:style>
+            <p:txBody>
+              <a:bodyPr rtlCol="0" anchor="ctr"/>
+              <a:lstStyle/>
+              <a:p>
+                <a:pPr algn="ctr"/>
+                <a:endParaRPr lang="ko-KR" altLang="en-US"/>
+              </a:p>
+            </p:txBody>
+          </p:sp>
+          <p:sp>
+            <p:nvSpPr>
+              <p:cNvPr id="22" name="직사각형 21"/>
+              <p:cNvSpPr/>
+              <p:nvPr/>
+            </p:nvSpPr>
+            <p:spPr>
+              <a:xfrm>
+                <a:off x="8562109" y="2626433"/>
+                <a:ext cx="415636" cy="45719"/>
+              </a:xfrm>
+              <a:prstGeom prst="rect">
+                <a:avLst/>
+              </a:prstGeom>
+              <a:solidFill>
+                <a:srgbClr val="FF0000"/>
+              </a:solidFill>
+              <a:ln>
+                <a:noFill/>
+              </a:ln>
+            </p:spPr>
+            <p:style>
+              <a:lnRef idx="2">
+                <a:schemeClr val="accent1">
+                  <a:shade val="50000"/>
+                </a:schemeClr>
+              </a:lnRef>
+              <a:fillRef idx="1">
+                <a:schemeClr val="accent1"/>
+              </a:fillRef>
+              <a:effectRef idx="0">
+                <a:schemeClr val="accent1"/>
+              </a:effectRef>
+              <a:fontRef idx="minor">
+                <a:schemeClr val="lt1"/>
+              </a:fontRef>
+            </p:style>
+            <p:txBody>
+              <a:bodyPr rtlCol="0" anchor="ctr"/>
+              <a:lstStyle/>
+              <a:p>
+                <a:pPr algn="ctr"/>
+                <a:endParaRPr lang="ko-KR" altLang="en-US"/>
+              </a:p>
+            </p:txBody>
+          </p:sp>
+          <p:sp>
+            <p:nvSpPr>
+              <p:cNvPr id="23" name="직사각형 22"/>
+              <p:cNvSpPr/>
+              <p:nvPr/>
+            </p:nvSpPr>
+            <p:spPr>
+              <a:xfrm>
+                <a:off x="9587345" y="2423811"/>
+                <a:ext cx="415636" cy="45719"/>
+              </a:xfrm>
+              <a:prstGeom prst="rect">
+                <a:avLst/>
+              </a:prstGeom>
+              <a:solidFill>
+                <a:srgbClr val="FF0000"/>
+              </a:solidFill>
+              <a:ln>
+                <a:noFill/>
+              </a:ln>
+            </p:spPr>
+            <p:style>
+              <a:lnRef idx="2">
+                <a:schemeClr val="accent1">
+                  <a:shade val="50000"/>
+                </a:schemeClr>
+              </a:lnRef>
+              <a:fillRef idx="1">
+                <a:schemeClr val="accent1"/>
+              </a:fillRef>
+              <a:effectRef idx="0">
+                <a:schemeClr val="accent1"/>
+              </a:effectRef>
+              <a:fontRef idx="minor">
+                <a:schemeClr val="lt1"/>
+              </a:fontRef>
+            </p:style>
+            <p:txBody>
+              <a:bodyPr rtlCol="0" anchor="ctr"/>
+              <a:lstStyle/>
+              <a:p>
+                <a:pPr algn="ctr"/>
+                <a:endParaRPr lang="ko-KR" altLang="en-US"/>
+              </a:p>
+            </p:txBody>
+          </p:sp>
+          <p:sp>
+            <p:nvSpPr>
+              <p:cNvPr id="24" name="직사각형 23"/>
+              <p:cNvSpPr/>
+              <p:nvPr/>
+            </p:nvSpPr>
+            <p:spPr>
+              <a:xfrm>
+                <a:off x="9587345" y="2626433"/>
+                <a:ext cx="415636" cy="45719"/>
+              </a:xfrm>
+              <a:prstGeom prst="rect">
+                <a:avLst/>
+              </a:prstGeom>
+              <a:solidFill>
+                <a:srgbClr val="FF0000"/>
+              </a:solidFill>
+              <a:ln>
+                <a:noFill/>
+              </a:ln>
+            </p:spPr>
+            <p:style>
+              <a:lnRef idx="2">
+                <a:schemeClr val="accent1">
+                  <a:shade val="50000"/>
+                </a:schemeClr>
+              </a:lnRef>
+              <a:fillRef idx="1">
+                <a:schemeClr val="accent1"/>
+              </a:fillRef>
+              <a:effectRef idx="0">
+                <a:schemeClr val="accent1"/>
+              </a:effectRef>
+              <a:fontRef idx="minor">
+                <a:schemeClr val="lt1"/>
+              </a:fontRef>
+            </p:style>
+            <p:txBody>
+              <a:bodyPr rtlCol="0" anchor="ctr"/>
+              <a:lstStyle/>
+              <a:p>
+                <a:pPr algn="ctr"/>
+                <a:endParaRPr lang="ko-KR" altLang="en-US"/>
+              </a:p>
+            </p:txBody>
+          </p:sp>
+        </p:grpSp>
+        <p:pic>
+          <p:nvPicPr>
+            <p:cNvPr id="27" name="그림 26"/>
+            <p:cNvPicPr>
+              <a:picLocks noChangeAspect="1"/>
+            </p:cNvPicPr>
+            <p:nvPr>
+              <p:custDataLst>
+                <p:tags r:id="rId4"/>
+              </p:custDataLst>
+            </p:nvPr>
+          </p:nvPicPr>
+          <p:blipFill>
+            <a:blip r:embed="rId10">
+              <a:extLst>
+                <a:ext uri="{28A0092B-C50C-407E-A947-70E740481C1C}">
+                  <a14:useLocalDpi xmlns:a14="http://schemas.microsoft.com/office/drawing/2010/main" val="0"/>
+                </a:ext>
+              </a:extLst>
+            </a:blip>
+            <a:stretch>
+              <a:fillRect/>
+            </a:stretch>
+          </p:blipFill>
+          <p:spPr bwMode="black">
+            <a:xfrm>
+              <a:off x="10955225" y="2849400"/>
+              <a:ext cx="166667" cy="219048"/>
+            </a:xfrm>
+            <a:prstGeom prst="rect">
+              <a:avLst/>
+            </a:prstGeom>
+          </p:spPr>
+        </p:pic>
+        <p:pic>
+          <p:nvPicPr>
+            <p:cNvPr id="29" name="그림 28"/>
+            <p:cNvPicPr>
+              <a:picLocks noChangeAspect="1"/>
+            </p:cNvPicPr>
+            <p:nvPr>
+              <p:custDataLst>
+                <p:tags r:id="rId5"/>
+              </p:custDataLst>
+            </p:nvPr>
+          </p:nvPicPr>
+          <p:blipFill>
+            <a:blip r:embed="rId11">
+              <a:extLst>
+                <a:ext uri="{28A0092B-C50C-407E-A947-70E740481C1C}">
+                  <a14:useLocalDpi xmlns:a14="http://schemas.microsoft.com/office/drawing/2010/main" val="0"/>
+                </a:ext>
+              </a:extLst>
+            </a:blip>
+            <a:stretch>
+              <a:fillRect/>
+            </a:stretch>
+          </p:blipFill>
+          <p:spPr bwMode="black">
+            <a:xfrm>
+              <a:off x="7794413" y="2903127"/>
+              <a:ext cx="466667" cy="238095"/>
+            </a:xfrm>
+            <a:prstGeom prst="rect">
+              <a:avLst/>
+            </a:prstGeom>
+          </p:spPr>
+        </p:pic>
+        <p:pic>
+          <p:nvPicPr>
+            <p:cNvPr id="32" name="그림 31"/>
+            <p:cNvPicPr>
+              <a:picLocks noChangeAspect="1"/>
+            </p:cNvPicPr>
+            <p:nvPr>
+              <p:custDataLst>
+                <p:tags r:id="rId6"/>
+              </p:custDataLst>
+            </p:nvPr>
+          </p:nvPicPr>
+          <p:blipFill>
+            <a:blip r:embed="rId12">
+              <a:extLst>
+                <a:ext uri="{28A0092B-C50C-407E-A947-70E740481C1C}">
+                  <a14:useLocalDpi xmlns:a14="http://schemas.microsoft.com/office/drawing/2010/main" val="0"/>
+                </a:ext>
+              </a:extLst>
+            </a:blip>
+            <a:stretch>
+              <a:fillRect/>
+            </a:stretch>
+          </p:blipFill>
+          <p:spPr bwMode="black">
+            <a:xfrm>
+              <a:off x="10888615" y="3247568"/>
+              <a:ext cx="285715" cy="261906"/>
+            </a:xfrm>
+            <a:prstGeom prst="rect">
+              <a:avLst/>
+            </a:prstGeom>
+          </p:spPr>
+        </p:pic>
+        <p:sp>
+          <p:nvSpPr>
+            <p:cNvPr id="34" name="오른쪽 화살표 33"/>
+            <p:cNvSpPr/>
+            <p:nvPr/>
+          </p:nvSpPr>
+          <p:spPr>
+            <a:xfrm>
+              <a:off x="8310336" y="2901979"/>
+              <a:ext cx="304343" cy="238991"/>
+            </a:xfrm>
+            <a:prstGeom prst="rightArrow">
+              <a:avLst/>
+            </a:prstGeom>
+            <a:solidFill>
+              <a:srgbClr val="00B0F0"/>
+            </a:solidFill>
+            <a:ln>
+              <a:noFill/>
+            </a:ln>
+          </p:spPr>
+          <p:style>
+            <a:lnRef idx="2">
+              <a:schemeClr val="accent1">
+                <a:shade val="50000"/>
+              </a:schemeClr>
+            </a:lnRef>
+            <a:fillRef idx="1">
+              <a:schemeClr val="accent1"/>
+            </a:fillRef>
+            <a:effectRef idx="0">
+              <a:schemeClr val="accent1"/>
+            </a:effectRef>
+            <a:fontRef idx="minor">
+              <a:schemeClr val="lt1"/>
+            </a:fontRef>
+          </p:style>
+          <p:txBody>
+            <a:bodyPr rtlCol="0" anchor="ctr"/>
+            <a:lstStyle/>
+            <a:p>
+              <a:pPr algn="ctr"/>
+              <a:endParaRPr lang="ko-KR" altLang="en-US"/>
+            </a:p>
+          </p:txBody>
+        </p:sp>
+        <p:sp>
+          <p:nvSpPr>
+            <p:cNvPr id="35" name="오른쪽 화살표 34"/>
+            <p:cNvSpPr/>
+            <p:nvPr/>
+          </p:nvSpPr>
+          <p:spPr>
+            <a:xfrm>
+              <a:off x="10548853" y="2918618"/>
+              <a:ext cx="304343" cy="152253"/>
+            </a:xfrm>
+            <a:prstGeom prst="rightArrow">
+              <a:avLst/>
+            </a:prstGeom>
+            <a:solidFill>
+              <a:srgbClr val="00B0F0"/>
+            </a:solidFill>
+            <a:ln>
+              <a:noFill/>
+            </a:ln>
+          </p:spPr>
+          <p:style>
+            <a:lnRef idx="2">
+              <a:schemeClr val="accent1">
+                <a:shade val="50000"/>
+              </a:schemeClr>
+            </a:lnRef>
+            <a:fillRef idx="1">
+              <a:schemeClr val="accent1"/>
+            </a:fillRef>
+            <a:effectRef idx="0">
+              <a:schemeClr val="accent1"/>
+            </a:effectRef>
+            <a:fontRef idx="minor">
+              <a:schemeClr val="lt1"/>
+            </a:fontRef>
+          </p:style>
+          <p:txBody>
+            <a:bodyPr rtlCol="0" anchor="ctr"/>
+            <a:lstStyle/>
+            <a:p>
+              <a:pPr algn="ctr"/>
+              <a:endParaRPr lang="ko-KR" altLang="en-US"/>
+            </a:p>
+          </p:txBody>
+        </p:sp>
+        <p:sp>
+          <p:nvSpPr>
+            <p:cNvPr id="36" name="오른쪽 화살표 35"/>
+            <p:cNvSpPr/>
+            <p:nvPr/>
+          </p:nvSpPr>
+          <p:spPr>
+            <a:xfrm>
+              <a:off x="10548853" y="3295676"/>
+              <a:ext cx="304343" cy="160776"/>
+            </a:xfrm>
+            <a:prstGeom prst="rightArrow">
+              <a:avLst/>
+            </a:prstGeom>
+            <a:solidFill>
+              <a:srgbClr val="00B0F0"/>
+            </a:solidFill>
+            <a:ln>
+              <a:noFill/>
+            </a:ln>
+          </p:spPr>
+          <p:style>
+            <a:lnRef idx="2">
+              <a:schemeClr val="accent1">
+                <a:shade val="50000"/>
+              </a:schemeClr>
+            </a:lnRef>
+            <a:fillRef idx="1">
+              <a:schemeClr val="accent1"/>
+            </a:fillRef>
+            <a:effectRef idx="0">
+              <a:schemeClr val="accent1"/>
+            </a:effectRef>
+            <a:fontRef idx="minor">
+              <a:schemeClr val="lt1"/>
+            </a:fontRef>
+          </p:style>
+          <p:txBody>
+            <a:bodyPr rtlCol="0" anchor="ctr"/>
+            <a:lstStyle/>
+            <a:p>
+              <a:pPr algn="ctr"/>
+              <a:endParaRPr lang="ko-KR" altLang="en-US"/>
+            </a:p>
+          </p:txBody>
+        </p:sp>
+      </p:grpSp>
+      <p:grpSp>
+        <p:nvGrpSpPr>
+          <p:cNvPr id="52" name="그룹 51"/>
+          <p:cNvGrpSpPr/>
+          <p:nvPr/>
+        </p:nvGrpSpPr>
+        <p:grpSpPr>
+          <a:xfrm>
+            <a:off x="8058471" y="3938581"/>
+            <a:ext cx="3431384" cy="754119"/>
+            <a:chOff x="8006516" y="3876236"/>
+            <a:chExt cx="3431384" cy="754119"/>
+          </a:xfrm>
+        </p:grpSpPr>
+        <p:grpSp>
+          <p:nvGrpSpPr>
+            <p:cNvPr id="39" name="그룹 38"/>
+            <p:cNvGrpSpPr/>
+            <p:nvPr/>
+          </p:nvGrpSpPr>
+          <p:grpSpPr>
+            <a:xfrm>
+              <a:off x="8725473" y="3876236"/>
+              <a:ext cx="1815357" cy="754119"/>
+              <a:chOff x="8562109" y="2342372"/>
+              <a:chExt cx="1440872" cy="405245"/>
+            </a:xfrm>
+          </p:grpSpPr>
+          <p:sp>
+            <p:nvSpPr>
+              <p:cNvPr id="46" name="직사각형 45"/>
+              <p:cNvSpPr/>
+              <p:nvPr/>
+            </p:nvSpPr>
+            <p:spPr>
+              <a:xfrm>
+                <a:off x="8977745" y="2342372"/>
+                <a:ext cx="609600" cy="405245"/>
+              </a:xfrm>
+              <a:prstGeom prst="rect">
+                <a:avLst/>
+              </a:prstGeom>
+              <a:solidFill>
+                <a:srgbClr val="FF0000"/>
+              </a:solidFill>
+              <a:ln>
+                <a:noFill/>
+              </a:ln>
+            </p:spPr>
+            <p:style>
+              <a:lnRef idx="2">
+                <a:schemeClr val="accent1">
+                  <a:shade val="50000"/>
+                </a:schemeClr>
+              </a:lnRef>
+              <a:fillRef idx="1">
+                <a:schemeClr val="accent1"/>
+              </a:fillRef>
+              <a:effectRef idx="0">
+                <a:schemeClr val="accent1"/>
+              </a:effectRef>
+              <a:fontRef idx="minor">
+                <a:schemeClr val="lt1"/>
+              </a:fontRef>
+            </p:style>
+            <p:txBody>
+              <a:bodyPr rtlCol="0" anchor="ctr"/>
+              <a:lstStyle/>
+              <a:p>
+                <a:pPr algn="ctr"/>
+                <a:endParaRPr lang="ko-KR" altLang="en-US"/>
+              </a:p>
+            </p:txBody>
+          </p:sp>
+          <p:sp>
+            <p:nvSpPr>
+              <p:cNvPr id="47" name="직사각형 46"/>
+              <p:cNvSpPr/>
+              <p:nvPr/>
+            </p:nvSpPr>
+            <p:spPr>
+              <a:xfrm>
+                <a:off x="8562109" y="2423811"/>
+                <a:ext cx="415636" cy="45719"/>
+              </a:xfrm>
+              <a:prstGeom prst="rect">
+                <a:avLst/>
+              </a:prstGeom>
+              <a:solidFill>
+                <a:srgbClr val="FF0000"/>
+              </a:solidFill>
+              <a:ln>
+                <a:noFill/>
+              </a:ln>
+            </p:spPr>
+            <p:style>
+              <a:lnRef idx="2">
+                <a:schemeClr val="accent1">
+                  <a:shade val="50000"/>
+                </a:schemeClr>
+              </a:lnRef>
+              <a:fillRef idx="1">
+                <a:schemeClr val="accent1"/>
+              </a:fillRef>
+              <a:effectRef idx="0">
+                <a:schemeClr val="accent1"/>
+              </a:effectRef>
+              <a:fontRef idx="minor">
+                <a:schemeClr val="lt1"/>
+              </a:fontRef>
+            </p:style>
+            <p:txBody>
+              <a:bodyPr rtlCol="0" anchor="ctr"/>
+              <a:lstStyle/>
+              <a:p>
+                <a:pPr algn="ctr"/>
+                <a:endParaRPr lang="ko-KR" altLang="en-US"/>
+              </a:p>
+            </p:txBody>
+          </p:sp>
+          <p:sp>
+            <p:nvSpPr>
+              <p:cNvPr id="48" name="직사각형 47"/>
+              <p:cNvSpPr/>
+              <p:nvPr/>
+            </p:nvSpPr>
+            <p:spPr>
+              <a:xfrm>
+                <a:off x="8562109" y="2626433"/>
+                <a:ext cx="415636" cy="45719"/>
+              </a:xfrm>
+              <a:prstGeom prst="rect">
+                <a:avLst/>
+              </a:prstGeom>
+              <a:solidFill>
+                <a:srgbClr val="FF0000"/>
+              </a:solidFill>
+              <a:ln>
+                <a:noFill/>
+              </a:ln>
+            </p:spPr>
+            <p:style>
+              <a:lnRef idx="2">
+                <a:schemeClr val="accent1">
+                  <a:shade val="50000"/>
+                </a:schemeClr>
+              </a:lnRef>
+              <a:fillRef idx="1">
+                <a:schemeClr val="accent1"/>
+              </a:fillRef>
+              <a:effectRef idx="0">
+                <a:schemeClr val="accent1"/>
+              </a:effectRef>
+              <a:fontRef idx="minor">
+                <a:schemeClr val="lt1"/>
+              </a:fontRef>
+            </p:style>
+            <p:txBody>
+              <a:bodyPr rtlCol="0" anchor="ctr"/>
+              <a:lstStyle/>
+              <a:p>
+                <a:pPr algn="ctr"/>
+                <a:endParaRPr lang="ko-KR" altLang="en-US"/>
+              </a:p>
+            </p:txBody>
+          </p:sp>
+          <p:sp>
+            <p:nvSpPr>
+              <p:cNvPr id="49" name="직사각형 48"/>
+              <p:cNvSpPr/>
+              <p:nvPr/>
+            </p:nvSpPr>
+            <p:spPr>
+              <a:xfrm>
+                <a:off x="9587345" y="2423811"/>
+                <a:ext cx="415636" cy="45719"/>
+              </a:xfrm>
+              <a:prstGeom prst="rect">
+                <a:avLst/>
+              </a:prstGeom>
+              <a:solidFill>
+                <a:srgbClr val="FF0000"/>
+              </a:solidFill>
+              <a:ln>
+                <a:noFill/>
+              </a:ln>
+            </p:spPr>
+            <p:style>
+              <a:lnRef idx="2">
+                <a:schemeClr val="accent1">
+                  <a:shade val="50000"/>
+                </a:schemeClr>
+              </a:lnRef>
+              <a:fillRef idx="1">
+                <a:schemeClr val="accent1"/>
+              </a:fillRef>
+              <a:effectRef idx="0">
+                <a:schemeClr val="accent1"/>
+              </a:effectRef>
+              <a:fontRef idx="minor">
+                <a:schemeClr val="lt1"/>
+              </a:fontRef>
+            </p:style>
+            <p:txBody>
+              <a:bodyPr rtlCol="0" anchor="ctr"/>
+              <a:lstStyle/>
+              <a:p>
+                <a:pPr algn="ctr"/>
+                <a:endParaRPr lang="ko-KR" altLang="en-US"/>
+              </a:p>
+            </p:txBody>
+          </p:sp>
+          <p:sp>
+            <p:nvSpPr>
+              <p:cNvPr id="50" name="직사각형 49"/>
+              <p:cNvSpPr/>
+              <p:nvPr/>
+            </p:nvSpPr>
+            <p:spPr>
+              <a:xfrm>
+                <a:off x="9587345" y="2626433"/>
+                <a:ext cx="415636" cy="45719"/>
+              </a:xfrm>
+              <a:prstGeom prst="rect">
+                <a:avLst/>
+              </a:prstGeom>
+              <a:solidFill>
+                <a:srgbClr val="FF0000"/>
+              </a:solidFill>
+              <a:ln>
+                <a:noFill/>
+              </a:ln>
+            </p:spPr>
+            <p:style>
+              <a:lnRef idx="2">
+                <a:schemeClr val="accent1">
+                  <a:shade val="50000"/>
+                </a:schemeClr>
+              </a:lnRef>
+              <a:fillRef idx="1">
+                <a:schemeClr val="accent1"/>
+              </a:fillRef>
+              <a:effectRef idx="0">
+                <a:schemeClr val="accent1"/>
+              </a:effectRef>
+              <a:fontRef idx="minor">
+                <a:schemeClr val="lt1"/>
+              </a:fontRef>
+            </p:style>
+            <p:txBody>
+              <a:bodyPr rtlCol="0" anchor="ctr"/>
+              <a:lstStyle/>
+              <a:p>
+                <a:pPr algn="ctr"/>
+                <a:endParaRPr lang="ko-KR" altLang="en-US"/>
+              </a:p>
+            </p:txBody>
+          </p:sp>
+        </p:grpSp>
+        <p:pic>
+          <p:nvPicPr>
+            <p:cNvPr id="40" name="그림 39"/>
+            <p:cNvPicPr>
+              <a:picLocks noChangeAspect="1"/>
+            </p:cNvPicPr>
+            <p:nvPr>
+              <p:custDataLst>
+                <p:tags r:id="rId1"/>
+              </p:custDataLst>
+            </p:nvPr>
+          </p:nvPicPr>
+          <p:blipFill>
+            <a:blip r:embed="rId10">
+              <a:extLst>
+                <a:ext uri="{28A0092B-C50C-407E-A947-70E740481C1C}">
+                  <a14:useLocalDpi xmlns:a14="http://schemas.microsoft.com/office/drawing/2010/main" val="0"/>
+                </a:ext>
+              </a:extLst>
+            </a:blip>
+            <a:stretch>
+              <a:fillRect/>
+            </a:stretch>
+          </p:blipFill>
+          <p:spPr bwMode="black">
+            <a:xfrm>
+              <a:off x="8102743" y="3944171"/>
+              <a:ext cx="166667" cy="219048"/>
+            </a:xfrm>
+            <a:prstGeom prst="rect">
+              <a:avLst/>
+            </a:prstGeom>
+          </p:spPr>
+        </p:pic>
+        <p:pic>
+          <p:nvPicPr>
+            <p:cNvPr id="41" name="그림 40"/>
+            <p:cNvPicPr>
+              <a:picLocks noChangeAspect="1"/>
+            </p:cNvPicPr>
+            <p:nvPr>
+              <p:custDataLst>
+                <p:tags r:id="rId2"/>
+              </p:custDataLst>
+            </p:nvPr>
+          </p:nvPicPr>
+          <p:blipFill>
+            <a:blip r:embed="rId11">
+              <a:extLst>
+                <a:ext uri="{28A0092B-C50C-407E-A947-70E740481C1C}">
+                  <a14:useLocalDpi xmlns:a14="http://schemas.microsoft.com/office/drawing/2010/main" val="0"/>
+                </a:ext>
+              </a:extLst>
+            </a:blip>
+            <a:stretch>
+              <a:fillRect/>
+            </a:stretch>
+          </p:blipFill>
+          <p:spPr bwMode="black">
+            <a:xfrm>
+              <a:off x="10971233" y="4334936"/>
+              <a:ext cx="466667" cy="238095"/>
+            </a:xfrm>
+            <a:prstGeom prst="rect">
+              <a:avLst/>
+            </a:prstGeom>
+          </p:spPr>
+        </p:pic>
+        <p:pic>
+          <p:nvPicPr>
+            <p:cNvPr id="42" name="그림 41"/>
+            <p:cNvPicPr>
+              <a:picLocks noChangeAspect="1"/>
+            </p:cNvPicPr>
+            <p:nvPr>
+              <p:custDataLst>
+                <p:tags r:id="rId3"/>
+              </p:custDataLst>
+            </p:nvPr>
+          </p:nvPicPr>
+          <p:blipFill>
+            <a:blip r:embed="rId12">
+              <a:extLst>
+                <a:ext uri="{28A0092B-C50C-407E-A947-70E740481C1C}">
+                  <a14:useLocalDpi xmlns:a14="http://schemas.microsoft.com/office/drawing/2010/main" val="0"/>
+                </a:ext>
+              </a:extLst>
+            </a:blip>
+            <a:stretch>
+              <a:fillRect/>
+            </a:stretch>
+          </p:blipFill>
+          <p:spPr bwMode="black">
+            <a:xfrm>
+              <a:off x="8006516" y="4323031"/>
+              <a:ext cx="285715" cy="261906"/>
+            </a:xfrm>
+            <a:prstGeom prst="rect">
+              <a:avLst/>
+            </a:prstGeom>
+          </p:spPr>
+        </p:pic>
+        <p:sp>
+          <p:nvSpPr>
+            <p:cNvPr id="43" name="오른쪽 화살표 42"/>
+            <p:cNvSpPr/>
+            <p:nvPr/>
+          </p:nvSpPr>
+          <p:spPr>
+            <a:xfrm>
+              <a:off x="10603860" y="4332373"/>
+              <a:ext cx="304343" cy="238991"/>
+            </a:xfrm>
+            <a:prstGeom prst="rightArrow">
+              <a:avLst/>
+            </a:prstGeom>
+            <a:solidFill>
+              <a:srgbClr val="00B0F0"/>
+            </a:solidFill>
+            <a:ln>
+              <a:noFill/>
+            </a:ln>
+          </p:spPr>
+          <p:style>
+            <a:lnRef idx="2">
+              <a:schemeClr val="accent1">
+                <a:shade val="50000"/>
+              </a:schemeClr>
+            </a:lnRef>
+            <a:fillRef idx="1">
+              <a:schemeClr val="accent1"/>
+            </a:fillRef>
+            <a:effectRef idx="0">
+              <a:schemeClr val="accent1"/>
+            </a:effectRef>
+            <a:fontRef idx="minor">
+              <a:schemeClr val="lt1"/>
+            </a:fontRef>
+          </p:style>
+          <p:txBody>
+            <a:bodyPr rtlCol="0" anchor="ctr"/>
+            <a:lstStyle/>
+            <a:p>
+              <a:pPr algn="ctr"/>
+              <a:endParaRPr lang="ko-KR" altLang="en-US"/>
+            </a:p>
+          </p:txBody>
+        </p:sp>
+        <p:sp>
+          <p:nvSpPr>
+            <p:cNvPr id="44" name="오른쪽 화살표 43"/>
+            <p:cNvSpPr/>
+            <p:nvPr/>
+          </p:nvSpPr>
+          <p:spPr>
+            <a:xfrm>
+              <a:off x="8365190" y="4010966"/>
+              <a:ext cx="304343" cy="152253"/>
+            </a:xfrm>
+            <a:prstGeom prst="rightArrow">
+              <a:avLst/>
+            </a:prstGeom>
+            <a:solidFill>
+              <a:srgbClr val="00B0F0"/>
+            </a:solidFill>
+            <a:ln>
+              <a:noFill/>
+            </a:ln>
+          </p:spPr>
+          <p:style>
+            <a:lnRef idx="2">
+              <a:schemeClr val="accent1">
+                <a:shade val="50000"/>
+              </a:schemeClr>
+            </a:lnRef>
+            <a:fillRef idx="1">
+              <a:schemeClr val="accent1"/>
+            </a:fillRef>
+            <a:effectRef idx="0">
+              <a:schemeClr val="accent1"/>
+            </a:effectRef>
+            <a:fontRef idx="minor">
+              <a:schemeClr val="lt1"/>
+            </a:fontRef>
+          </p:style>
+          <p:txBody>
+            <a:bodyPr rtlCol="0" anchor="ctr"/>
+            <a:lstStyle/>
+            <a:p>
+              <a:pPr algn="ctr"/>
+              <a:endParaRPr lang="ko-KR" altLang="en-US"/>
+            </a:p>
+          </p:txBody>
+        </p:sp>
+        <p:sp>
+          <p:nvSpPr>
+            <p:cNvPr id="45" name="오른쪽 화살표 44"/>
+            <p:cNvSpPr/>
+            <p:nvPr/>
+          </p:nvSpPr>
+          <p:spPr>
+            <a:xfrm>
+              <a:off x="8365190" y="4388024"/>
+              <a:ext cx="304343" cy="160776"/>
+            </a:xfrm>
+            <a:prstGeom prst="rightArrow">
+              <a:avLst/>
+            </a:prstGeom>
+            <a:solidFill>
+              <a:srgbClr val="00B0F0"/>
+            </a:solidFill>
+            <a:ln>
+              <a:noFill/>
+            </a:ln>
+          </p:spPr>
+          <p:style>
+            <a:lnRef idx="2">
+              <a:schemeClr val="accent1">
+                <a:shade val="50000"/>
+              </a:schemeClr>
+            </a:lnRef>
+            <a:fillRef idx="1">
+              <a:schemeClr val="accent1"/>
+            </a:fillRef>
+            <a:effectRef idx="0">
+              <a:schemeClr val="accent1"/>
+            </a:effectRef>
+            <a:fontRef idx="minor">
+              <a:schemeClr val="lt1"/>
+            </a:fontRef>
+          </p:style>
+          <p:txBody>
+            <a:bodyPr rtlCol="0" anchor="ctr"/>
+            <a:lstStyle/>
+            <a:p>
+              <a:pPr algn="ctr"/>
+              <a:endParaRPr lang="ko-KR" altLang="en-US"/>
+            </a:p>
+          </p:txBody>
+        </p:sp>
+      </p:grpSp>
+      <p:sp>
+        <p:nvSpPr>
+          <p:cNvPr id="53" name="TextBox 52"/>
+          <p:cNvSpPr txBox="1"/>
+          <p:nvPr/>
+        </p:nvSpPr>
+        <p:spPr>
+          <a:xfrm>
+            <a:off x="2665978" y="3094284"/>
+            <a:ext cx="897682" cy="646331"/>
+          </a:xfrm>
+          <a:prstGeom prst="rect">
+            <a:avLst/>
+          </a:prstGeom>
+          <a:noFill/>
+        </p:spPr>
+        <p:txBody>
+          <a:bodyPr wrap="none" rtlCol="0">
+            <a:spAutoFit/>
+          </a:bodyPr>
+          <a:lstStyle/>
+          <a:p>
+            <a:pPr algn="ctr"/>
+            <a:r>
+              <a:rPr lang="en-US" altLang="ko-KR" dirty="0" smtClean="0"/>
+              <a:t>3 dB </a:t>
+            </a:r>
+          </a:p>
+          <a:p>
+            <a:pPr algn="ctr"/>
+            <a:r>
+              <a:rPr lang="en-US" altLang="ko-KR" dirty="0" smtClean="0"/>
+              <a:t>splitter</a:t>
+            </a:r>
+            <a:endParaRPr lang="ko-KR" altLang="en-US"/>
+          </a:p>
+        </p:txBody>
+      </p:sp>
+      <p:sp>
+        <p:nvSpPr>
+          <p:cNvPr id="54" name="TextBox 53"/>
+          <p:cNvSpPr txBox="1"/>
+          <p:nvPr/>
+        </p:nvSpPr>
+        <p:spPr>
+          <a:xfrm>
+            <a:off x="4938151" y="1265046"/>
+            <a:ext cx="1308371" cy="369332"/>
+          </a:xfrm>
+          <a:prstGeom prst="rect">
+            <a:avLst/>
+          </a:prstGeom>
+          <a:noFill/>
+        </p:spPr>
+        <p:txBody>
+          <a:bodyPr wrap="none" rtlCol="0">
+            <a:spAutoFit/>
+          </a:bodyPr>
+          <a:lstStyle/>
+          <a:p>
+            <a:pPr algn="ctr"/>
+            <a:r>
+              <a:rPr lang="en-US" altLang="ko-KR" dirty="0" smtClean="0"/>
+              <a:t>2 X 2 MMI</a:t>
+            </a:r>
+            <a:endParaRPr lang="ko-KR" altLang="en-US"/>
+          </a:p>
+        </p:txBody>
+      </p:sp>
+      <p:cxnSp>
+        <p:nvCxnSpPr>
+          <p:cNvPr id="56" name="직선 화살표 연결선 55"/>
+          <p:cNvCxnSpPr>
+            <a:stCxn id="54" idx="2"/>
+          </p:cNvCxnSpPr>
+          <p:nvPr/>
+        </p:nvCxnSpPr>
+        <p:spPr>
+          <a:xfrm flipH="1">
+            <a:off x="5455227" y="1634378"/>
+            <a:ext cx="137110" cy="844176"/>
+          </a:xfrm>
+          <a:prstGeom prst="straightConnector1">
+            <a:avLst/>
+          </a:prstGeom>
+          <a:ln>
+            <a:tailEnd type="triangle"/>
+          </a:ln>
+        </p:spPr>
+        <p:style>
+          <a:lnRef idx="1">
+            <a:schemeClr val="accent1"/>
+          </a:lnRef>
+          <a:fillRef idx="0">
+            <a:schemeClr val="accent1"/>
+          </a:fillRef>
+          <a:effectRef idx="0">
+            <a:schemeClr val="accent1"/>
+          </a:effectRef>
+          <a:fontRef idx="minor">
+            <a:schemeClr val="tx1"/>
+          </a:fontRef>
+        </p:style>
+      </p:cxnSp>
+      <p:sp>
+        <p:nvSpPr>
+          <p:cNvPr id="57" name="모서리가 둥근 직사각형 56"/>
+          <p:cNvSpPr/>
+          <p:nvPr/>
+        </p:nvSpPr>
+        <p:spPr>
+          <a:xfrm>
+            <a:off x="3563660" y="3564082"/>
+            <a:ext cx="2494240" cy="1477667"/>
+          </a:xfrm>
+          <a:prstGeom prst="roundRect">
+            <a:avLst/>
+          </a:prstGeom>
+          <a:noFill/>
+          <a:ln>
+            <a:solidFill>
+              <a:schemeClr val="tx1"/>
+            </a:solidFill>
+            <a:prstDash val="dash"/>
+          </a:ln>
+        </p:spPr>
+        <p:style>
+          <a:lnRef idx="2">
+            <a:schemeClr val="accent1">
+              <a:shade val="50000"/>
+            </a:schemeClr>
+          </a:lnRef>
+          <a:fillRef idx="1">
+            <a:schemeClr val="accent1"/>
+          </a:fillRef>
+          <a:effectRef idx="0">
+            <a:schemeClr val="accent1"/>
+          </a:effectRef>
+          <a:fontRef idx="minor">
+            <a:schemeClr val="lt1"/>
+          </a:fontRef>
+        </p:style>
+        <p:txBody>
+          <a:bodyPr rtlCol="0" anchor="ctr"/>
+          <a:lstStyle/>
+          <a:p>
+            <a:pPr algn="ctr"/>
+            <a:endParaRPr lang="ko-KR" altLang="en-US"/>
+          </a:p>
+        </p:txBody>
+      </p:sp>
+      <p:sp>
+        <p:nvSpPr>
+          <p:cNvPr id="58" name="모서리가 둥근 직사각형 57"/>
+          <p:cNvSpPr/>
+          <p:nvPr/>
+        </p:nvSpPr>
+        <p:spPr>
+          <a:xfrm>
+            <a:off x="3553602" y="1801283"/>
+            <a:ext cx="2494240" cy="1477667"/>
+          </a:xfrm>
+          <a:prstGeom prst="roundRect">
+            <a:avLst/>
+          </a:prstGeom>
+          <a:noFill/>
+          <a:ln>
+            <a:solidFill>
+              <a:schemeClr val="tx1"/>
+            </a:solidFill>
+            <a:prstDash val="dash"/>
+          </a:ln>
+        </p:spPr>
+        <p:style>
+          <a:lnRef idx="2">
+            <a:schemeClr val="accent1">
+              <a:shade val="50000"/>
+            </a:schemeClr>
+          </a:lnRef>
+          <a:fillRef idx="1">
+            <a:schemeClr val="accent1"/>
+          </a:fillRef>
+          <a:effectRef idx="0">
+            <a:schemeClr val="accent1"/>
+          </a:effectRef>
+          <a:fontRef idx="minor">
+            <a:schemeClr val="lt1"/>
+          </a:fontRef>
+        </p:style>
+        <p:txBody>
+          <a:bodyPr rtlCol="0" anchor="ctr"/>
+          <a:lstStyle/>
+          <a:p>
+            <a:pPr algn="ctr"/>
+            <a:endParaRPr lang="ko-KR" altLang="en-US"/>
+          </a:p>
+        </p:txBody>
+      </p:sp>
+      <p:sp>
+        <p:nvSpPr>
+          <p:cNvPr id="59" name="TextBox 58"/>
+          <p:cNvSpPr txBox="1"/>
+          <p:nvPr/>
+        </p:nvSpPr>
+        <p:spPr>
+          <a:xfrm>
+            <a:off x="2290602" y="1974568"/>
+            <a:ext cx="1271502" cy="369332"/>
+          </a:xfrm>
+          <a:prstGeom prst="rect">
+            <a:avLst/>
+          </a:prstGeom>
+          <a:noFill/>
+        </p:spPr>
+        <p:txBody>
+          <a:bodyPr wrap="none" rtlCol="0">
+            <a:spAutoFit/>
+          </a:bodyPr>
+          <a:lstStyle/>
+          <a:p>
+            <a:r>
+              <a:rPr lang="en-US" altLang="ko-KR" dirty="0"/>
+              <a:t>u</a:t>
+            </a:r>
+            <a:r>
+              <a:rPr lang="en-US" altLang="ko-KR" dirty="0" smtClean="0"/>
+              <a:t>pper PBS</a:t>
+            </a:r>
+            <a:endParaRPr lang="ko-KR" altLang="en-US"/>
+          </a:p>
+        </p:txBody>
+      </p:sp>
+      <p:sp>
+        <p:nvSpPr>
+          <p:cNvPr id="60" name="TextBox 59"/>
+          <p:cNvSpPr txBox="1"/>
+          <p:nvPr/>
+        </p:nvSpPr>
+        <p:spPr>
+          <a:xfrm>
+            <a:off x="5455227" y="5041749"/>
+            <a:ext cx="1225400" cy="369332"/>
+          </a:xfrm>
+          <a:prstGeom prst="rect">
+            <a:avLst/>
+          </a:prstGeom>
+          <a:noFill/>
+        </p:spPr>
+        <p:txBody>
+          <a:bodyPr wrap="none" rtlCol="0">
+            <a:spAutoFit/>
+          </a:bodyPr>
+          <a:lstStyle/>
+          <a:p>
+            <a:r>
+              <a:rPr lang="en-US" altLang="ko-KR" dirty="0" smtClean="0"/>
+              <a:t>lower PBS</a:t>
+            </a:r>
+            <a:endParaRPr lang="ko-KR" altLang="en-US"/>
+          </a:p>
+        </p:txBody>
+      </p:sp>
     </p:spTree>
     <p:extLst>
       <p:ext uri="{BB962C8B-B14F-4D97-AF65-F5344CB8AC3E}">
@@ -3465,6 +4792,96 @@
     </p:tnLst>
   </p:timing>
 </p:sld>
+</file>
+
+<file path=ppt/tags/tag1.xml><?xml version="1.0" encoding="utf-8"?>
+<p:tagLst xmlns:a="http://schemas.openxmlformats.org/drawingml/2006/main" xmlns:r="http://schemas.openxmlformats.org/officeDocument/2006/relationships" xmlns:p="http://schemas.openxmlformats.org/presentationml/2006/main">
+  <p:tag name="LATEXCODE" val="\begin{equation*}\r\n \vec{E}\r\n\end{equation*}\r\n"/>
+  <p:tag name="LATEXFONTSIZE" val="18"/>
+  <p:tag name="LATEXTEXTCOLOR" val="0,0,0"/>
+  <p:tag name="LATEXDPI" val="192"/>
+  <p:tag name="LATEXFONT" val="Computer Modern Roman"/>
+  <p:tag name="LATEXFONTSERIES" val="Standard"/>
+  <p:tag name="LATEXFONTSHAPE" val="Standard"/>
+  <p:tag name="LATEXISINLINE" val="False"/>
+  <p:tag name="LATEXTEXTSHAPEID" val="-1"/>
+  <p:tag name="LATEXADDINVERSION" val="1.2.0.1"/>
+</p:tagLst>
+</file>
+
+<file path=ppt/tags/tag2.xml><?xml version="1.0" encoding="utf-8"?>
+<p:tagLst xmlns:a="http://schemas.openxmlformats.org/drawingml/2006/main" xmlns:r="http://schemas.openxmlformats.org/officeDocument/2006/relationships" xmlns:p="http://schemas.openxmlformats.org/presentationml/2006/main">
+  <p:tag name="LATEXCODE" val="\begin{equation*}\r\n{\sqrt{2}}\vec{E}\r\n\end{equation*}\r\n"/>
+  <p:tag name="LATEXFONTSIZE" val="18"/>
+  <p:tag name="LATEXTEXTCOLOR" val="0,0,0"/>
+  <p:tag name="LATEXDPI" val="192"/>
+  <p:tag name="LATEXFONT" val="Computer Modern Roman"/>
+  <p:tag name="LATEXFONTSERIES" val="Standard"/>
+  <p:tag name="LATEXFONTSHAPE" val="Standard"/>
+  <p:tag name="LATEXISINLINE" val="False"/>
+  <p:tag name="LATEXTEXTSHAPEID" val="-1"/>
+  <p:tag name="LATEXADDINVERSION" val="1.2.0.1"/>
+</p:tagLst>
+</file>
+
+<file path=ppt/tags/tag3.xml><?xml version="1.0" encoding="utf-8"?>
+<p:tagLst xmlns:a="http://schemas.openxmlformats.org/drawingml/2006/main" xmlns:r="http://schemas.openxmlformats.org/officeDocument/2006/relationships" xmlns:p="http://schemas.openxmlformats.org/presentationml/2006/main">
+  <p:tag name="LATEXCODE" val="\begin{equation*}\r\n j\vec{E}\r\n\end{equation*}\r\n"/>
+  <p:tag name="LATEXFONTSIZE" val="18"/>
+  <p:tag name="LATEXTEXTCOLOR" val="0,0,0"/>
+  <p:tag name="LATEXDPI" val="192"/>
+  <p:tag name="LATEXFONT" val="Computer Modern Roman"/>
+  <p:tag name="LATEXFONTSERIES" val="Standard"/>
+  <p:tag name="LATEXFONTSHAPE" val="Standard"/>
+  <p:tag name="LATEXISINLINE" val="False"/>
+  <p:tag name="LATEXTEXTSHAPEID" val="-1"/>
+  <p:tag name="LATEXADDINVERSION" val="1.2.0.1"/>
+</p:tagLst>
+</file>
+
+<file path=ppt/tags/tag4.xml><?xml version="1.0" encoding="utf-8"?>
+<p:tagLst xmlns:a="http://schemas.openxmlformats.org/drawingml/2006/main" xmlns:r="http://schemas.openxmlformats.org/officeDocument/2006/relationships" xmlns:p="http://schemas.openxmlformats.org/presentationml/2006/main">
+  <p:tag name="LATEXCODE" val="\begin{equation*}\r\n \vec{E}\r\n\end{equation*}\r\n"/>
+  <p:tag name="LATEXFONTSIZE" val="18"/>
+  <p:tag name="LATEXTEXTCOLOR" val="0,0,0"/>
+  <p:tag name="LATEXDPI" val="192"/>
+  <p:tag name="LATEXFONT" val="Computer Modern Roman"/>
+  <p:tag name="LATEXFONTSERIES" val="Standard"/>
+  <p:tag name="LATEXFONTSHAPE" val="Standard"/>
+  <p:tag name="LATEXISINLINE" val="False"/>
+  <p:tag name="LATEXTEXTSHAPEID" val="-1"/>
+  <p:tag name="LATEXADDINVERSION" val="1.2.0.1"/>
+</p:tagLst>
+</file>
+
+<file path=ppt/tags/tag5.xml><?xml version="1.0" encoding="utf-8"?>
+<p:tagLst xmlns:a="http://schemas.openxmlformats.org/drawingml/2006/main" xmlns:r="http://schemas.openxmlformats.org/officeDocument/2006/relationships" xmlns:p="http://schemas.openxmlformats.org/presentationml/2006/main">
+  <p:tag name="LATEXCODE" val="\begin{equation*}\r\n{\sqrt{2}}\vec{E}\r\n\end{equation*}\r\n"/>
+  <p:tag name="LATEXFONTSIZE" val="18"/>
+  <p:tag name="LATEXTEXTCOLOR" val="0,0,0"/>
+  <p:tag name="LATEXDPI" val="192"/>
+  <p:tag name="LATEXFONT" val="Computer Modern Roman"/>
+  <p:tag name="LATEXFONTSERIES" val="Standard"/>
+  <p:tag name="LATEXFONTSHAPE" val="Standard"/>
+  <p:tag name="LATEXISINLINE" val="False"/>
+  <p:tag name="LATEXTEXTSHAPEID" val="-1"/>
+  <p:tag name="LATEXADDINVERSION" val="1.2.0.1"/>
+</p:tagLst>
+</file>
+
+<file path=ppt/tags/tag6.xml><?xml version="1.0" encoding="utf-8"?>
+<p:tagLst xmlns:a="http://schemas.openxmlformats.org/drawingml/2006/main" xmlns:r="http://schemas.openxmlformats.org/officeDocument/2006/relationships" xmlns:p="http://schemas.openxmlformats.org/presentationml/2006/main">
+  <p:tag name="LATEXCODE" val="\begin{equation*}\r\n j\vec{E}\r\n\end{equation*}\r\n"/>
+  <p:tag name="LATEXFONTSIZE" val="18"/>
+  <p:tag name="LATEXTEXTCOLOR" val="0,0,0"/>
+  <p:tag name="LATEXDPI" val="192"/>
+  <p:tag name="LATEXFONT" val="Computer Modern Roman"/>
+  <p:tag name="LATEXFONTSERIES" val="Standard"/>
+  <p:tag name="LATEXFONTSHAPE" val="Standard"/>
+  <p:tag name="LATEXISINLINE" val="False"/>
+  <p:tag name="LATEXTEXTSHAPEID" val="-1"/>
+  <p:tag name="LATEXADDINVERSION" val="1.2.0.1"/>
+</p:tagLst>
 </file>
 
 <file path=ppt/theme/theme1.xml><?xml version="1.0" encoding="utf-8"?>

</xml_diff>